<commit_message>
Added hypothesis section to poster
</commit_message>
<xml_diff>
--- a/MiCFiG_Poster.pptx
+++ b/MiCFiG_Poster.pptx
@@ -3907,7 +3907,7 @@
         <p:spPr>
           <a:xfrm>
             <a:off x="754592" y="6898479"/>
-            <a:ext cx="8392838" cy="4983993"/>
+            <a:ext cx="8392838" cy="5396862"/>
           </a:xfrm>
           <a:prstGeom prst="rect">
             <a:avLst/>
@@ -3965,23 +3965,7 @@
                 <a:ea typeface="Arial" charset="0"/>
                 <a:cs typeface="Arial" charset="0"/>
               </a:rPr>
-              <a:t>If an incompatibility exists, we expect to see variation in nuclear-encoded, mitochondrial-targeting genes (</a:t>
-            </a:r>
-            <a:r>
-              <a:rPr lang="en-US" sz="2683" dirty="0" err="1">
-                <a:latin typeface="Arial" charset="0"/>
-                <a:ea typeface="Arial" charset="0"/>
-                <a:cs typeface="Arial" charset="0"/>
-              </a:rPr>
-              <a:t>Nmt</a:t>
-            </a:r>
-            <a:r>
-              <a:rPr lang="en-US" sz="2683" dirty="0">
-                <a:latin typeface="Arial" charset="0"/>
-                <a:ea typeface="Arial" charset="0"/>
-                <a:cs typeface="Arial" charset="0"/>
-              </a:rPr>
-              <a:t> genes).</a:t>
+              <a:t>If an incompatibility exists, we expect to see variation in nuclear-encoded mitochondrial-targeting genes (NMT genes) among sexual parental species.</a:t>
             </a:r>
           </a:p>
         </p:txBody>
@@ -3994,7 +3978,7 @@
         </p:nvSpPr>
         <p:spPr>
           <a:xfrm>
-            <a:off x="-1202053" y="14440481"/>
+            <a:off x="-1202054" y="16190061"/>
             <a:ext cx="11927417" cy="737381"/>
           </a:xfrm>
           <a:prstGeom prst="rect">
@@ -4031,8 +4015,8 @@
         </p:nvSpPr>
         <p:spPr>
           <a:xfrm>
-            <a:off x="705909" y="15338365"/>
-            <a:ext cx="8490203" cy="855299"/>
+            <a:off x="484047" y="17174740"/>
+            <a:ext cx="8490203" cy="1681038"/>
           </a:xfrm>
           <a:prstGeom prst="rect">
             <a:avLst/>
@@ -4056,11 +4040,28 @@
               <a:buFont typeface="Arial" panose="020B0604020202020204" pitchFamily="34" charset="0"/>
               <a:buChar char="•"/>
             </a:pPr>
-            <a:endParaRPr lang="en-US" sz="2683" dirty="0">
-              <a:latin typeface="Arial" charset="0"/>
-              <a:ea typeface="Arial" charset="0"/>
-              <a:cs typeface="Arial" charset="0"/>
-            </a:endParaRPr>
+            <a:r>
+              <a:rPr lang="en-US" sz="2683" dirty="0">
+                <a:latin typeface="Arial" charset="0"/>
+                <a:ea typeface="Arial" charset="0"/>
+                <a:cs typeface="Arial" charset="0"/>
+              </a:rPr>
+              <a:t>Whole-genome sequencing of four sexual whiptails was conducted</a:t>
+            </a:r>
+          </a:p>
+          <a:p>
+            <a:pPr marL="547668" indent="-547668">
+              <a:buFont typeface="Arial" panose="020B0604020202020204" pitchFamily="34" charset="0"/>
+              <a:buChar char="•"/>
+            </a:pPr>
+            <a:r>
+              <a:rPr lang="en-US" sz="2683" dirty="0">
+                <a:latin typeface="Arial" charset="0"/>
+                <a:ea typeface="Arial" charset="0"/>
+                <a:cs typeface="Arial" charset="0"/>
+              </a:rPr>
+              <a:t>Reads were processed in </a:t>
+            </a:r>
           </a:p>
         </p:txBody>
       </p:sp>
@@ -4304,8 +4305,8 @@
         </p:nvSpPr>
         <p:spPr>
           <a:xfrm>
-            <a:off x="681566" y="12826668"/>
-            <a:ext cx="8514546" cy="855299"/>
+            <a:off x="713714" y="13374035"/>
+            <a:ext cx="8514546" cy="2093907"/>
           </a:xfrm>
           <a:prstGeom prst="rect">
             <a:avLst/>
@@ -4325,10 +4326,13 @@
           </a:bodyPr>
           <a:lstStyle/>
           <a:p>
-            <a:endParaRPr lang="en-US" sz="2683" dirty="0">
-              <a:latin typeface="Arial" panose="020B0604020202020204" pitchFamily="34" charset="0"/>
-              <a:cs typeface="Arial" panose="020B0604020202020204" pitchFamily="34" charset="0"/>
-            </a:endParaRPr>
+            <a:r>
+              <a:rPr lang="en-US" sz="2683" dirty="0">
+                <a:latin typeface="Arial" panose="020B0604020202020204" pitchFamily="34" charset="0"/>
+                <a:cs typeface="Arial" panose="020B0604020202020204" pitchFamily="34" charset="0"/>
+              </a:rPr>
+              <a:t>Lower endurance and mitochondrial respiration is due to incompatibility in NMT genes resulting from either: (A) inter-genomic (mother-mother) interactions or (B) intragenomic (mother-father) interactions</a:t>
+            </a:r>
           </a:p>
         </p:txBody>
       </p:sp>
@@ -4346,7 +4350,7 @@
         </p:nvSpPr>
         <p:spPr>
           <a:xfrm>
-            <a:off x="-1202053" y="11887973"/>
+            <a:off x="-1131366" y="12647564"/>
             <a:ext cx="11927417" cy="737381"/>
           </a:xfrm>
           <a:prstGeom prst="rect">

</xml_diff>